<commit_message>
Update Intro CeTI TP
</commit_message>
<xml_diff>
--- a/CeTI/b0_intro/B0_1_CeTI.pptx
+++ b/CeTI/b0_intro/B0_1_CeTI.pptx
@@ -235,7 +235,7 @@
           <a:p>
             <a:fld id="{729C724E-499D-43AC-8699-CF969D2466FC}" type="datetimeFigureOut">
               <a:rPr lang="fr-FR" smtClean="0"/>
-              <a:t>08/09/2023</a:t>
+              <a:t>11/09/2023</a:t>
             </a:fld>
             <a:endParaRPr lang="fr-FR"/>
           </a:p>
@@ -1078,7 +1078,7 @@
           <a:p>
             <a:fld id="{02AC24A9-CCB6-4F8D-B8DB-C2F3692CFA5A}" type="datetimeFigureOut">
               <a:rPr lang="en-US" smtClean="0"/>
-              <a:t>9/8/2023</a:t>
+              <a:t>9/11/2023</a:t>
             </a:fld>
             <a:endParaRPr lang="en-US" dirty="0"/>
           </a:p>
@@ -1448,7 +1448,7 @@
           <a:p>
             <a:fld id="{02AC24A9-CCB6-4F8D-B8DB-C2F3692CFA5A}" type="datetimeFigureOut">
               <a:rPr lang="en-US" smtClean="0"/>
-              <a:t>9/8/2023</a:t>
+              <a:t>9/11/2023</a:t>
             </a:fld>
             <a:endParaRPr lang="en-US"/>
           </a:p>
@@ -1657,7 +1657,7 @@
           <a:p>
             <a:fld id="{02AC24A9-CCB6-4F8D-B8DB-C2F3692CFA5A}" type="datetimeFigureOut">
               <a:rPr lang="en-US" smtClean="0"/>
-              <a:t>9/8/2023</a:t>
+              <a:t>9/11/2023</a:t>
             </a:fld>
             <a:endParaRPr lang="en-US"/>
           </a:p>
@@ -2127,7 +2127,7 @@
           <a:p>
             <a:fld id="{02AC24A9-CCB6-4F8D-B8DB-C2F3692CFA5A}" type="datetimeFigureOut">
               <a:rPr lang="en-US" smtClean="0"/>
-              <a:t>9/8/2023</a:t>
+              <a:t>9/11/2023</a:t>
             </a:fld>
             <a:endParaRPr lang="en-US"/>
           </a:p>
@@ -2581,7 +2581,7 @@
           <a:p>
             <a:fld id="{02AC24A9-CCB6-4F8D-B8DB-C2F3692CFA5A}" type="datetimeFigureOut">
               <a:rPr lang="en-US" smtClean="0"/>
-              <a:t>9/8/2023</a:t>
+              <a:t>9/11/2023</a:t>
             </a:fld>
             <a:endParaRPr lang="en-US"/>
           </a:p>
@@ -3113,7 +3113,7 @@
           <a:p>
             <a:fld id="{02AC24A9-CCB6-4F8D-B8DB-C2F3692CFA5A}" type="datetimeFigureOut">
               <a:rPr lang="en-US" smtClean="0"/>
-              <a:t>9/8/2023</a:t>
+              <a:t>9/11/2023</a:t>
             </a:fld>
             <a:endParaRPr lang="en-US"/>
           </a:p>
@@ -3812,7 +3812,7 @@
           <a:p>
             <a:fld id="{02AC24A9-CCB6-4F8D-B8DB-C2F3692CFA5A}" type="datetimeFigureOut">
               <a:rPr lang="en-US" smtClean="0"/>
-              <a:t>9/8/2023</a:t>
+              <a:t>9/11/2023</a:t>
             </a:fld>
             <a:endParaRPr lang="en-US"/>
           </a:p>
@@ -4141,7 +4141,7 @@
           <a:p>
             <a:fld id="{02AC24A9-CCB6-4F8D-B8DB-C2F3692CFA5A}" type="datetimeFigureOut">
               <a:rPr lang="en-US" smtClean="0"/>
-              <a:t>9/8/2023</a:t>
+              <a:t>9/11/2023</a:t>
             </a:fld>
             <a:endParaRPr lang="en-US"/>
           </a:p>
@@ -4254,7 +4254,7 @@
           <a:p>
             <a:fld id="{02AC24A9-CCB6-4F8D-B8DB-C2F3692CFA5A}" type="datetimeFigureOut">
               <a:rPr lang="en-US" smtClean="0"/>
-              <a:t>9/8/2023</a:t>
+              <a:t>9/11/2023</a:t>
             </a:fld>
             <a:endParaRPr lang="en-US"/>
           </a:p>
@@ -4749,7 +4749,7 @@
           <a:p>
             <a:fld id="{02AC24A9-CCB6-4F8D-B8DB-C2F3692CFA5A}" type="datetimeFigureOut">
               <a:rPr lang="en-US" smtClean="0"/>
-              <a:t>9/8/2023</a:t>
+              <a:t>9/11/2023</a:t>
             </a:fld>
             <a:endParaRPr lang="en-US" dirty="0"/>
           </a:p>
@@ -5226,7 +5226,7 @@
           <a:p>
             <a:fld id="{02AC24A9-CCB6-4F8D-B8DB-C2F3692CFA5A}" type="datetimeFigureOut">
               <a:rPr lang="en-US" smtClean="0"/>
-              <a:t>9/8/2023</a:t>
+              <a:t>9/11/2023</a:t>
             </a:fld>
             <a:endParaRPr lang="en-US"/>
           </a:p>
@@ -5469,7 +5469,7 @@
           <a:p>
             <a:fld id="{02AC24A9-CCB6-4F8D-B8DB-C2F3692CFA5A}" type="datetimeFigureOut">
               <a:rPr lang="en-US" smtClean="0"/>
-              <a:t>9/8/2023</a:t>
+              <a:t>9/11/2023</a:t>
             </a:fld>
             <a:endParaRPr lang="en-US"/>
           </a:p>

</xml_diff>